<commit_message>
final version of Phase 2 presentation
</commit_message>
<xml_diff>
--- a/docs/W-9 Working Document/W-9.3 Presentation Slides/Phase 2/vms_presentation_2_v0.1.pptx
+++ b/docs/W-9 Working Document/W-9.3 Presentation Slides/Phase 2/vms_presentation_2_v0.1.pptx
@@ -19394,14 +19394,14 @@
           <p:nvPr>
             <p:extLst>
               <p:ext uri="{D42A27DB-BD31-4B8C-83A1-F6EECF244321}">
-                <p14:modId xmlns:p14="http://schemas.microsoft.com/office/powerpoint/2010/main" val="2891435187"/>
+                <p14:modId xmlns:p14="http://schemas.microsoft.com/office/powerpoint/2010/main" val="3362897560"/>
               </p:ext>
             </p:extLst>
           </p:nvPr>
         </p:nvGraphicFramePr>
         <p:xfrm>
           <a:off x="533400" y="1600200"/>
-          <a:ext cx="8196580" cy="4471601"/>
+          <a:ext cx="8196580" cy="4628190"/>
         </p:xfrm>
         <a:graphic>
           <a:graphicData uri="http://schemas.openxmlformats.org/drawingml/2006/table">
@@ -20256,6 +20256,36 @@
                         </a:rPr>
                         <a:t> reports</a:t>
                       </a:r>
+                    </a:p>
+                    <a:p>
+                      <a:pPr marL="0" marR="0" indent="0" algn="l" defTabSz="914400" rtl="0" eaLnBrk="1" fontAlgn="auto" latinLnBrk="0" hangingPunct="1">
+                        <a:lnSpc>
+                          <a:spcPct val="100000"/>
+                        </a:lnSpc>
+                        <a:spcBef>
+                          <a:spcPts val="0"/>
+                        </a:spcBef>
+                        <a:spcAft>
+                          <a:spcPts val="0"/>
+                        </a:spcAft>
+                        <a:buClrTx/>
+                        <a:buSzTx/>
+                        <a:buFont typeface="Arial" pitchFamily="34" charset="0"/>
+                        <a:buChar char="•"/>
+                        <a:tabLst/>
+                        <a:defRPr/>
+                      </a:pPr>
+                      <a:r>
+                        <a:rPr lang="en-US" sz="1800" kern="1200" baseline="0" dirty="0" smtClean="0">
+                          <a:solidFill>
+                            <a:schemeClr val="dk1"/>
+                          </a:solidFill>
+                          <a:latin typeface="+mn-lt"/>
+                          <a:ea typeface="+mn-ea"/>
+                          <a:cs typeface="+mn-cs"/>
+                        </a:rPr>
+                        <a:t>User guide</a:t>
+                      </a:r>
                       <a:endParaRPr lang="en-US" sz="1800" kern="1200" dirty="0" smtClean="0">
                         <a:solidFill>
                           <a:schemeClr val="dk1"/>
@@ -20294,6 +20324,16 @@
                       <a:r>
                         <a:rPr lang="en-US" baseline="0" dirty="0" smtClean="0"/>
                         <a:t> Manager</a:t>
+                      </a:r>
+                    </a:p>
+                    <a:p>
+                      <a:pPr>
+                        <a:buFont typeface="Arial" pitchFamily="34" charset="0"/>
+                        <a:buChar char="•"/>
+                      </a:pPr>
+                      <a:r>
+                        <a:rPr lang="en-US" baseline="0" dirty="0" smtClean="0"/>
+                        <a:t>Business Analyst</a:t>
                       </a:r>
                       <a:endParaRPr lang="en-US" dirty="0"/>
                     </a:p>
@@ -22897,25 +22937,70 @@
           </a:p>
         </p:txBody>
       </p:sp>
-      <p:sp>
-        <p:nvSpPr>
-          <p:cNvPr id="2" name="Content Placeholder 1"/>
-          <p:cNvSpPr>
-            <a:spLocks noGrp="1"/>
-          </p:cNvSpPr>
-          <p:nvPr>
-            <p:ph idx="1"/>
-          </p:nvPr>
-        </p:nvSpPr>
-        <p:spPr/>
-        <p:txBody>
-          <a:bodyPr/>
-          <a:lstStyle/>
-          <a:p>
-            <a:endParaRPr lang="en-US" dirty="0"/>
-          </a:p>
-        </p:txBody>
-      </p:sp>
+      <p:pic>
+        <p:nvPicPr>
+          <p:cNvPr id="8195" name="Picture 3"/>
+          <p:cNvPicPr>
+            <a:picLocks noChangeAspect="1" noChangeArrowheads="1"/>
+          </p:cNvPicPr>
+          <p:nvPr/>
+        </p:nvPicPr>
+        <p:blipFill>
+          <a:blip r:embed="rId2">
+            <a:extLst>
+              <a:ext uri="{28A0092B-C50C-407E-A947-70E740481C1C}">
+                <a14:useLocalDpi xmlns:a14="http://schemas.microsoft.com/office/drawing/2010/main" val="0"/>
+              </a:ext>
+            </a:extLst>
+          </a:blip>
+          <a:srcRect/>
+          <a:stretch>
+            <a:fillRect/>
+          </a:stretch>
+        </p:blipFill>
+        <p:spPr bwMode="auto">
+          <a:xfrm>
+            <a:off x="76200" y="1818620"/>
+            <a:ext cx="8991600" cy="3515380"/>
+          </a:xfrm>
+          <a:prstGeom prst="rect">
+            <a:avLst/>
+          </a:prstGeom>
+          <a:noFill/>
+          <a:ln>
+            <a:noFill/>
+          </a:ln>
+          <a:effectLst/>
+          <a:extLst>
+            <a:ext uri="{909E8E84-426E-40DD-AFC4-6F175D3DCCD1}">
+              <a14:hiddenFill xmlns:a14="http://schemas.microsoft.com/office/drawing/2010/main">
+                <a:solidFill>
+                  <a:schemeClr val="accent1"/>
+                </a:solidFill>
+              </a14:hiddenFill>
+            </a:ext>
+            <a:ext uri="{91240B29-F687-4F45-9708-019B960494DF}">
+              <a14:hiddenLine xmlns:a14="http://schemas.microsoft.com/office/drawing/2010/main" w="9525">
+                <a:solidFill>
+                  <a:schemeClr val="tx1"/>
+                </a:solidFill>
+                <a:miter lim="800000"/>
+                <a:headEnd/>
+                <a:tailEnd/>
+              </a14:hiddenLine>
+            </a:ext>
+            <a:ext uri="{AF507438-7753-43E0-B8FC-AC1667EBCBE1}">
+              <a14:hiddenEffects xmlns:a14="http://schemas.microsoft.com/office/drawing/2010/main">
+                <a:effectLst>
+                  <a:outerShdw dist="35921" dir="2700000" algn="ctr" rotWithShape="0">
+                    <a:schemeClr val="bg2"/>
+                  </a:outerShdw>
+                </a:effectLst>
+              </a14:hiddenEffects>
+            </a:ext>
+          </a:extLst>
+        </p:spPr>
+      </p:pic>
     </p:spTree>
     <p:extLst>
       <p:ext uri="{BB962C8B-B14F-4D97-AF65-F5344CB8AC3E}">
@@ -23145,6 +23230,47 @@
           </a:p>
         </p:txBody>
       </p:sp>
+      <p:pic>
+        <p:nvPicPr>
+          <p:cNvPr id="9218" name="Picture 2" descr="C:\Users\Dio\AppData\Local\Microsoft\Windows\Temporary Internet Files\Content.IE5\QY2JGCM3\MC900295360[1].wmf"/>
+          <p:cNvPicPr>
+            <a:picLocks noChangeAspect="1" noChangeArrowheads="1"/>
+          </p:cNvPicPr>
+          <p:nvPr/>
+        </p:nvPicPr>
+        <p:blipFill>
+          <a:blip r:embed="rId2" cstate="print">
+            <a:extLst>
+              <a:ext uri="{28A0092B-C50C-407E-A947-70E740481C1C}">
+                <a14:useLocalDpi xmlns:a14="http://schemas.microsoft.com/office/drawing/2010/main" val="0"/>
+              </a:ext>
+            </a:extLst>
+          </a:blip>
+          <a:srcRect/>
+          <a:stretch>
+            <a:fillRect/>
+          </a:stretch>
+        </p:blipFill>
+        <p:spPr bwMode="auto">
+          <a:xfrm>
+            <a:off x="6400800" y="1957996"/>
+            <a:ext cx="2435225" cy="2603500"/>
+          </a:xfrm>
+          <a:prstGeom prst="rect">
+            <a:avLst/>
+          </a:prstGeom>
+          <a:noFill/>
+          <a:extLst>
+            <a:ext uri="{909E8E84-426E-40DD-AFC4-6F175D3DCCD1}">
+              <a14:hiddenFill xmlns:a14="http://schemas.microsoft.com/office/drawing/2010/main">
+                <a:solidFill>
+                  <a:srgbClr val="FFFFFF"/>
+                </a:solidFill>
+              </a14:hiddenFill>
+            </a:ext>
+          </a:extLst>
+        </p:spPr>
+      </p:pic>
     </p:spTree>
     <p:extLst>
       <p:ext uri="{BB962C8B-B14F-4D97-AF65-F5344CB8AC3E}">
@@ -23240,14 +23366,14 @@
           <p:nvPr>
             <p:extLst>
               <p:ext uri="{D42A27DB-BD31-4B8C-83A1-F6EECF244321}">
-                <p14:modId xmlns:p14="http://schemas.microsoft.com/office/powerpoint/2010/main" val="70321911"/>
+                <p14:modId xmlns:p14="http://schemas.microsoft.com/office/powerpoint/2010/main" val="1852051571"/>
               </p:ext>
             </p:extLst>
           </p:nvPr>
         </p:nvGraphicFramePr>
         <p:xfrm>
           <a:off x="337820" y="1524000"/>
-          <a:ext cx="8196580" cy="5264082"/>
+          <a:ext cx="8196580" cy="3300216"/>
         </p:xfrm>
         <a:graphic>
           <a:graphicData uri="http://schemas.openxmlformats.org/drawingml/2006/table">
@@ -23258,8 +23384,8 @@
               <a:tblGrid>
                 <a:gridCol w="522838"/>
                 <a:gridCol w="1915562"/>
-                <a:gridCol w="2438400"/>
-                <a:gridCol w="3319780"/>
+                <a:gridCol w="2786380"/>
+                <a:gridCol w="2971800"/>
               </a:tblGrid>
               <a:tr h="509202">
                 <a:tc>
@@ -23387,119 +23513,12 @@
                       </a:r>
                       <a:r>
                         <a:rPr lang="en-US" baseline="0" dirty="0" smtClean="0"/>
-                        <a:t> a weekly </a:t>
-                      </a:r>
-                      <a:r>
-                        <a:rPr lang="en-US" baseline="0" smtClean="0"/>
-                        <a:t>meeting time</a:t>
-                      </a:r>
-                      <a:endParaRPr lang="en-US" dirty="0"/>
-                    </a:p>
-                  </a:txBody>
-                  <a:tcPr/>
-                </a:tc>
-              </a:tr>
-              <a:tr h="1929198">
-                <a:tc>
-                  <a:txBody>
-                    <a:bodyPr/>
-                    <a:lstStyle/>
-                    <a:p>
-                      <a:r>
-                        <a:rPr lang="en-US" dirty="0" smtClean="0"/>
-                        <a:t>2.</a:t>
-                      </a:r>
-                      <a:endParaRPr lang="en-US" dirty="0"/>
-                    </a:p>
-                  </a:txBody>
-                  <a:tcPr/>
-                </a:tc>
-                <a:tc>
-                  <a:txBody>
-                    <a:bodyPr/>
-                    <a:lstStyle/>
-                    <a:p>
-                      <a:r>
-                        <a:rPr lang="en-US" dirty="0" smtClean="0"/>
-                        <a:t>Requirements Gathering</a:t>
-                      </a:r>
-                      <a:endParaRPr lang="en-US" dirty="0"/>
-                    </a:p>
-                  </a:txBody>
-                  <a:tcPr/>
-                </a:tc>
-                <a:tc>
-                  <a:txBody>
-                    <a:bodyPr/>
-                    <a:lstStyle/>
-                    <a:p>
-                      <a:r>
-                        <a:rPr lang="en-US" dirty="0" smtClean="0"/>
-                        <a:t>Client only wants</a:t>
+                        <a:t> a weekly meeting </a:t>
                       </a:r>
                       <a:r>
                         <a:rPr lang="en-US" baseline="0" dirty="0" smtClean="0"/>
-                        <a:t> a small set of requirements.</a:t>
+                        <a:t>time</a:t>
                       </a:r>
-                      <a:endParaRPr lang="en-US" dirty="0"/>
-                    </a:p>
-                  </a:txBody>
-                  <a:tcPr/>
-                </a:tc>
-                <a:tc>
-                  <a:txBody>
-                    <a:bodyPr/>
-                    <a:lstStyle/>
-                    <a:p>
-                      <a:pPr>
-                        <a:buFont typeface="Arial" pitchFamily="34" charset="0"/>
-                        <a:buChar char="•"/>
-                      </a:pPr>
-                      <a:r>
-                        <a:rPr lang="en-US" dirty="0" smtClean="0"/>
-                        <a:t>Seek lecturers advice</a:t>
-                      </a:r>
-                    </a:p>
-                    <a:p>
-                      <a:pPr>
-                        <a:buFont typeface="Arial" pitchFamily="34" charset="0"/>
-                        <a:buChar char="•"/>
-                      </a:pPr>
-                      <a:r>
-                        <a:rPr lang="en-US" dirty="0" smtClean="0"/>
-                        <a:t>Propose</a:t>
-                      </a:r>
-                      <a:r>
-                        <a:rPr lang="en-US" baseline="0" dirty="0" smtClean="0"/>
-                        <a:t>d merging of requirements</a:t>
-                      </a:r>
-                    </a:p>
-                    <a:p>
-                      <a:pPr>
-                        <a:buFont typeface="Arial" pitchFamily="34" charset="0"/>
-                        <a:buChar char="•"/>
-                      </a:pPr>
-                      <a:r>
-                        <a:rPr lang="en-US" baseline="0" dirty="0" smtClean="0"/>
-                        <a:t>Appoint team members as putative end users</a:t>
-                      </a:r>
-                    </a:p>
-                    <a:p>
-                      <a:pPr>
-                        <a:buFont typeface="Arial" pitchFamily="34" charset="0"/>
-                        <a:buChar char="•"/>
-                      </a:pPr>
-                      <a:r>
-                        <a:rPr lang="en-US" baseline="0" dirty="0" smtClean="0"/>
-                        <a:t>Look for alternative customer</a:t>
-                      </a:r>
-                    </a:p>
-                    <a:p>
-                      <a:pPr>
-                        <a:buFont typeface="Arial" pitchFamily="34" charset="0"/>
-                        <a:buChar char="•"/>
-                      </a:pPr>
-                      <a:endParaRPr lang="en-US" dirty="0"/>
                     </a:p>
                   </a:txBody>
                   <a:tcPr/>
@@ -23513,7 +23532,7 @@
                     <a:p>
                       <a:r>
                         <a:rPr lang="en-US" dirty="0" smtClean="0"/>
-                        <a:t>3.</a:t>
+                        <a:t>2.</a:t>
                       </a:r>
                       <a:endParaRPr lang="en-US" dirty="0"/>
                     </a:p>
@@ -23541,11 +23560,11 @@
                     <a:p>
                       <a:r>
                         <a:rPr lang="en-US" dirty="0" smtClean="0"/>
-                        <a:t>Not able</a:t>
+                        <a:t>Visibility of</a:t>
                       </a:r>
                       <a:r>
                         <a:rPr lang="en-US" baseline="0" dirty="0" smtClean="0"/>
-                        <a:t> to meet deadline on time.</a:t>
+                        <a:t> task status.</a:t>
                       </a:r>
                       <a:endParaRPr lang="en-US" dirty="0"/>
                     </a:p>
@@ -23577,7 +23596,7 @@
                       </a:pPr>
                       <a:r>
                         <a:rPr lang="en-US" baseline="0" dirty="0" smtClean="0"/>
-                        <a:t>To hold meetings to track status</a:t>
+                        <a:t>Regular status update</a:t>
                       </a:r>
                       <a:endParaRPr lang="en-US" dirty="0"/>
                     </a:p>
@@ -23593,7 +23612,7 @@
                     <a:p>
                       <a:r>
                         <a:rPr lang="en-US" dirty="0" smtClean="0"/>
-                        <a:t>4.</a:t>
+                        <a:t>3.</a:t>
                       </a:r>
                       <a:endParaRPr lang="en-US" dirty="0"/>
                     </a:p>
@@ -23607,11 +23626,11 @@
                     <a:p>
                       <a:r>
                         <a:rPr lang="en-US" dirty="0" smtClean="0"/>
-                        <a:t>Low Quality</a:t>
+                        <a:t>Standard &amp; Quality</a:t>
                       </a:r>
                       <a:r>
                         <a:rPr lang="en-US" baseline="0" dirty="0" smtClean="0"/>
-                        <a:t> of Work</a:t>
+                        <a:t> variance</a:t>
                       </a:r>
                       <a:endParaRPr lang="en-US" dirty="0"/>
                     </a:p>
@@ -23625,7 +23644,7 @@
                     <a:p>
                       <a:r>
                         <a:rPr lang="en-US" dirty="0" smtClean="0"/>
-                        <a:t>Deliverables not up to standard.</a:t>
+                        <a:t>Different familiarity level within the team</a:t>
                       </a:r>
                       <a:endParaRPr lang="en-US" dirty="0"/>
                     </a:p>
@@ -23643,7 +23662,7 @@
                       </a:pPr>
                       <a:r>
                         <a:rPr lang="en-US" dirty="0" smtClean="0"/>
-                        <a:t>Perform reviews</a:t>
+                        <a:t>Guidance from lead</a:t>
                       </a:r>
                     </a:p>
                     <a:p>
@@ -23653,11 +23672,32 @@
                       </a:pPr>
                       <a:r>
                         <a:rPr lang="en-US" dirty="0" smtClean="0"/>
-                        <a:t>Conduct</a:t>
+                        <a:t>Peer reviews</a:t>
+                      </a:r>
+                    </a:p>
+                    <a:p>
+                      <a:pPr>
+                        <a:buFont typeface="Arial" pitchFamily="34" charset="0"/>
+                        <a:buChar char="•"/>
+                      </a:pPr>
+                      <a:r>
+                        <a:rPr lang="en-US" dirty="0" smtClean="0"/>
+                        <a:t>Code walk</a:t>
                       </a:r>
                       <a:r>
                         <a:rPr lang="en-US" baseline="0" dirty="0" smtClean="0"/>
-                        <a:t> briefing and demo on required items</a:t>
+                        <a:t>through</a:t>
+                      </a:r>
+                      <a:endParaRPr lang="en-US" dirty="0" smtClean="0"/>
+                    </a:p>
+                    <a:p>
+                      <a:pPr>
+                        <a:buFont typeface="Arial" pitchFamily="34" charset="0"/>
+                        <a:buChar char="•"/>
+                      </a:pPr>
+                      <a:r>
+                        <a:rPr lang="en-US" baseline="0" dirty="0" smtClean="0"/>
+                        <a:t>Pair development</a:t>
                       </a:r>
                       <a:endParaRPr lang="en-US" dirty="0"/>
                     </a:p>
@@ -23867,6 +23907,47 @@
           </a:p>
         </p:txBody>
       </p:sp>
+      <p:pic>
+        <p:nvPicPr>
+          <p:cNvPr id="11267" name="Picture 3" descr="C:\Users\Dio\AppData\Local\Microsoft\Windows\Temporary Internet Files\Content.IE5\8B09V6MG\MC900237869[1].wmf"/>
+          <p:cNvPicPr>
+            <a:picLocks noChangeAspect="1" noChangeArrowheads="1"/>
+          </p:cNvPicPr>
+          <p:nvPr/>
+        </p:nvPicPr>
+        <p:blipFill>
+          <a:blip r:embed="rId2" cstate="print">
+            <a:extLst>
+              <a:ext uri="{28A0092B-C50C-407E-A947-70E740481C1C}">
+                <a14:useLocalDpi xmlns:a14="http://schemas.microsoft.com/office/drawing/2010/main" val="0"/>
+              </a:ext>
+            </a:extLst>
+          </a:blip>
+          <a:srcRect/>
+          <a:stretch>
+            <a:fillRect/>
+          </a:stretch>
+        </p:blipFill>
+        <p:spPr bwMode="auto">
+          <a:xfrm>
+            <a:off x="6629400" y="1889919"/>
+            <a:ext cx="2057400" cy="1655512"/>
+          </a:xfrm>
+          <a:prstGeom prst="rect">
+            <a:avLst/>
+          </a:prstGeom>
+          <a:noFill/>
+          <a:extLst>
+            <a:ext uri="{909E8E84-426E-40DD-AFC4-6F175D3DCCD1}">
+              <a14:hiddenFill xmlns:a14="http://schemas.microsoft.com/office/drawing/2010/main">
+                <a:solidFill>
+                  <a:srgbClr val="FFFFFF"/>
+                </a:solidFill>
+              </a14:hiddenFill>
+            </a:ext>
+          </a:extLst>
+        </p:spPr>
+      </p:pic>
     </p:spTree>
     <p:extLst>
       <p:ext uri="{BB962C8B-B14F-4D97-AF65-F5344CB8AC3E}">
@@ -23929,16 +24010,20 @@
       </p:sp>
       <p:pic>
         <p:nvPicPr>
-          <p:cNvPr id="1027" name="Picture 3"/>
+          <p:cNvPr id="10242" name="Picture 2" descr="C:\Users\Dio\AppData\Local\Microsoft\Windows\Temporary Internet Files\Content.IE5\4DO3IWVQ\MC900234625[1].wmf"/>
           <p:cNvPicPr>
-            <a:picLocks noGrp="1" noChangeAspect="1" noChangeArrowheads="1"/>
+            <a:picLocks noChangeAspect="1" noChangeArrowheads="1"/>
           </p:cNvPicPr>
-          <p:nvPr>
-            <p:ph idx="1"/>
-          </p:nvPr>
+          <p:nvPr/>
         </p:nvPicPr>
         <p:blipFill>
-          <a:blip r:embed="rId2" cstate="print"/>
+          <a:blip r:embed="rId2" cstate="print">
+            <a:extLst>
+              <a:ext uri="{28A0092B-C50C-407E-A947-70E740481C1C}">
+                <a14:useLocalDpi xmlns:a14="http://schemas.microsoft.com/office/drawing/2010/main" val="0"/>
+              </a:ext>
+            </a:extLst>
+          </a:blip>
           <a:srcRect/>
           <a:stretch>
             <a:fillRect/>
@@ -23946,20 +24031,22 @@
         </p:blipFill>
         <p:spPr bwMode="auto">
           <a:xfrm>
-            <a:off x="2971800" y="2286000"/>
-            <a:ext cx="3352800" cy="2767723"/>
+            <a:off x="3756354" y="2518257"/>
+            <a:ext cx="1806245" cy="2016838"/>
           </a:xfrm>
           <a:prstGeom prst="rect">
             <a:avLst/>
           </a:prstGeom>
           <a:noFill/>
-          <a:ln w="9525">
-            <a:noFill/>
-            <a:miter lim="800000"/>
-            <a:headEnd/>
-            <a:tailEnd/>
-          </a:ln>
-          <a:effectLst/>
+          <a:extLst>
+            <a:ext uri="{909E8E84-426E-40DD-AFC4-6F175D3DCCD1}">
+              <a14:hiddenFill xmlns:a14="http://schemas.microsoft.com/office/drawing/2010/main">
+                <a:solidFill>
+                  <a:srgbClr val="FFFFFF"/>
+                </a:solidFill>
+              </a14:hiddenFill>
+            </a:ext>
+          </a:extLst>
         </p:spPr>
       </p:pic>
     </p:spTree>

</xml_diff>